<commit_message>
Add robustness fixes, documentation, and synthetic validation dataset
</commit_message>
<xml_diff>
--- a/synthetic_data/DRMV_synth_data.pptx
+++ b/synthetic_data/DRMV_synth_data.pptx
@@ -6,11 +6,12 @@
   </p:sldMasterIdLst>
   <p:sldIdLst>
     <p:sldId id="256" r:id="rId2"/>
-    <p:sldId id="258" r:id="rId3"/>
-    <p:sldId id="260" r:id="rId4"/>
-    <p:sldId id="259" r:id="rId5"/>
-    <p:sldId id="261" r:id="rId6"/>
-    <p:sldId id="263" r:id="rId7"/>
+    <p:sldId id="264" r:id="rId3"/>
+    <p:sldId id="258" r:id="rId4"/>
+    <p:sldId id="260" r:id="rId5"/>
+    <p:sldId id="259" r:id="rId6"/>
+    <p:sldId id="261" r:id="rId7"/>
+    <p:sldId id="263" r:id="rId8"/>
   </p:sldIdLst>
   <p:sldSz cx="12192000" cy="6858000"/>
   <p:notesSz cx="6858000" cy="9144000"/>
@@ -264,7 +265,7 @@
           <a:p>
             <a:fld id="{37E861E5-1C56-DB4C-940A-FA0ACB1C7014}" type="datetimeFigureOut">
               <a:rPr lang="en-US" smtClean="0"/>
-              <a:t>1/12/26</a:t>
+              <a:t>1/22/26</a:t>
             </a:fld>
             <a:endParaRPr lang="en-US"/>
           </a:p>
@@ -462,7 +463,7 @@
           <a:p>
             <a:fld id="{37E861E5-1C56-DB4C-940A-FA0ACB1C7014}" type="datetimeFigureOut">
               <a:rPr lang="en-US" smtClean="0"/>
-              <a:t>1/12/26</a:t>
+              <a:t>1/22/26</a:t>
             </a:fld>
             <a:endParaRPr lang="en-US"/>
           </a:p>
@@ -670,7 +671,7 @@
           <a:p>
             <a:fld id="{37E861E5-1C56-DB4C-940A-FA0ACB1C7014}" type="datetimeFigureOut">
               <a:rPr lang="en-US" smtClean="0"/>
-              <a:t>1/12/26</a:t>
+              <a:t>1/22/26</a:t>
             </a:fld>
             <a:endParaRPr lang="en-US"/>
           </a:p>
@@ -868,7 +869,7 @@
           <a:p>
             <a:fld id="{37E861E5-1C56-DB4C-940A-FA0ACB1C7014}" type="datetimeFigureOut">
               <a:rPr lang="en-US" smtClean="0"/>
-              <a:t>1/12/26</a:t>
+              <a:t>1/22/26</a:t>
             </a:fld>
             <a:endParaRPr lang="en-US"/>
           </a:p>
@@ -1143,7 +1144,7 @@
           <a:p>
             <a:fld id="{37E861E5-1C56-DB4C-940A-FA0ACB1C7014}" type="datetimeFigureOut">
               <a:rPr lang="en-US" smtClean="0"/>
-              <a:t>1/12/26</a:t>
+              <a:t>1/22/26</a:t>
             </a:fld>
             <a:endParaRPr lang="en-US"/>
           </a:p>
@@ -1408,7 +1409,7 @@
           <a:p>
             <a:fld id="{37E861E5-1C56-DB4C-940A-FA0ACB1C7014}" type="datetimeFigureOut">
               <a:rPr lang="en-US" smtClean="0"/>
-              <a:t>1/12/26</a:t>
+              <a:t>1/22/26</a:t>
             </a:fld>
             <a:endParaRPr lang="en-US"/>
           </a:p>
@@ -1820,7 +1821,7 @@
           <a:p>
             <a:fld id="{37E861E5-1C56-DB4C-940A-FA0ACB1C7014}" type="datetimeFigureOut">
               <a:rPr lang="en-US" smtClean="0"/>
-              <a:t>1/12/26</a:t>
+              <a:t>1/22/26</a:t>
             </a:fld>
             <a:endParaRPr lang="en-US"/>
           </a:p>
@@ -1961,7 +1962,7 @@
           <a:p>
             <a:fld id="{37E861E5-1C56-DB4C-940A-FA0ACB1C7014}" type="datetimeFigureOut">
               <a:rPr lang="en-US" smtClean="0"/>
-              <a:t>1/12/26</a:t>
+              <a:t>1/22/26</a:t>
             </a:fld>
             <a:endParaRPr lang="en-US"/>
           </a:p>
@@ -2074,7 +2075,7 @@
           <a:p>
             <a:fld id="{37E861E5-1C56-DB4C-940A-FA0ACB1C7014}" type="datetimeFigureOut">
               <a:rPr lang="en-US" smtClean="0"/>
-              <a:t>1/12/26</a:t>
+              <a:t>1/22/26</a:t>
             </a:fld>
             <a:endParaRPr lang="en-US"/>
           </a:p>
@@ -2385,7 +2386,7 @@
           <a:p>
             <a:fld id="{37E861E5-1C56-DB4C-940A-FA0ACB1C7014}" type="datetimeFigureOut">
               <a:rPr lang="en-US" smtClean="0"/>
-              <a:t>1/12/26</a:t>
+              <a:t>1/22/26</a:t>
             </a:fld>
             <a:endParaRPr lang="en-US"/>
           </a:p>
@@ -2673,7 +2674,7 @@
           <a:p>
             <a:fld id="{37E861E5-1C56-DB4C-940A-FA0ACB1C7014}" type="datetimeFigureOut">
               <a:rPr lang="en-US" smtClean="0"/>
-              <a:t>1/12/26</a:t>
+              <a:t>1/22/26</a:t>
             </a:fld>
             <a:endParaRPr lang="en-US"/>
           </a:p>
@@ -2914,7 +2915,7 @@
           <a:p>
             <a:fld id="{37E861E5-1C56-DB4C-940A-FA0ACB1C7014}" type="datetimeFigureOut">
               <a:rPr lang="en-US" smtClean="0"/>
-              <a:t>1/12/26</a:t>
+              <a:t>1/22/26</a:t>
             </a:fld>
             <a:endParaRPr lang="en-US"/>
           </a:p>
@@ -3355,8 +3356,12 @@
           <a:lstStyle/>
           <a:p>
             <a:r>
+              <a:rPr lang="en-US" dirty="0" err="1"/>
+              <a:t>hivdrm</a:t>
+            </a:r>
+            <a:r>
               <a:rPr lang="en-US" dirty="0"/>
-              <a:t>DRMV modified script Validation Report using Synthetic Dataset</a:t>
+              <a:t> modified script Validation Report using Synthetic Dataset</a:t>
             </a:r>
           </a:p>
         </p:txBody>
@@ -3375,6 +3380,107 @@
 </file>
 
 <file path=ppt/slides/slide2.xml><?xml version="1.0" encoding="utf-8"?>
+<p:sld xmlns:a="http://schemas.openxmlformats.org/drawingml/2006/main" xmlns:r="http://schemas.openxmlformats.org/officeDocument/2006/relationships" xmlns:p="http://schemas.openxmlformats.org/presentationml/2006/main">
+  <p:cSld>
+    <p:spTree>
+      <p:nvGrpSpPr>
+        <p:cNvPr id="1" name=""/>
+        <p:cNvGrpSpPr/>
+        <p:nvPr/>
+      </p:nvGrpSpPr>
+      <p:grpSpPr>
+        <a:xfrm>
+          <a:off x="0" y="0"/>
+          <a:ext cx="0" cy="0"/>
+          <a:chOff x="0" y="0"/>
+          <a:chExt cx="0" cy="0"/>
+        </a:xfrm>
+      </p:grpSpPr>
+      <p:sp>
+        <p:nvSpPr>
+          <p:cNvPr id="3" name="TextBox 2">
+            <a:extLst>
+              <a:ext uri="{FF2B5EF4-FFF2-40B4-BE49-F238E27FC236}">
+                <a16:creationId xmlns:a16="http://schemas.microsoft.com/office/drawing/2014/main" id="{AA83E108-B317-A99E-F55B-4EDC87565BA2}"/>
+              </a:ext>
+            </a:extLst>
+          </p:cNvPr>
+          <p:cNvSpPr txBox="1"/>
+          <p:nvPr/>
+        </p:nvSpPr>
+        <p:spPr>
+          <a:xfrm>
+            <a:off x="3048918" y="3247088"/>
+            <a:ext cx="6097836" cy="646331"/>
+          </a:xfrm>
+          <a:prstGeom prst="rect">
+            <a:avLst/>
+          </a:prstGeom>
+          <a:noFill/>
+        </p:spPr>
+        <p:txBody>
+          <a:bodyPr wrap="square">
+            <a:spAutoFit/>
+          </a:bodyPr>
+          <a:lstStyle/>
+          <a:p>
+            <a:r>
+              <a:rPr lang="en-US" dirty="0"/>
+              <a:t>previous  script: </a:t>
+            </a:r>
+            <a:r>
+              <a:rPr lang="en-US" b="0" i="0" u="sng" dirty="0">
+                <a:solidFill>
+                  <a:srgbClr val="0969DA"/>
+                </a:solidFill>
+                <a:effectLst/>
+                <a:highlight>
+                  <a:srgbClr val="FFFFFF"/>
+                </a:highlight>
+                <a:latin typeface="-apple-system"/>
+                <a:hlinkClick r:id="rId2"/>
+              </a:rPr>
+              <a:t>https://github.com/naumenko-sa/hivdrm</a:t>
+            </a:r>
+            <a:endParaRPr lang="en-US" dirty="0"/>
+          </a:p>
+          <a:p>
+            <a:r>
+              <a:rPr lang="en-US" dirty="0"/>
+              <a:t>modified script : </a:t>
+            </a:r>
+            <a:r>
+              <a:rPr lang="en-US" b="0" i="0" u="sng" dirty="0">
+                <a:solidFill>
+                  <a:srgbClr val="0969DA"/>
+                </a:solidFill>
+                <a:effectLst/>
+                <a:highlight>
+                  <a:srgbClr val="FFFFFF"/>
+                </a:highlight>
+                <a:latin typeface="-apple-system"/>
+                <a:hlinkClick r:id="rId2"/>
+              </a:rPr>
+              <a:t>https://github.com/rinkideo/hivdrm</a:t>
+            </a:r>
+            <a:endParaRPr lang="en-US" dirty="0"/>
+          </a:p>
+        </p:txBody>
+      </p:sp>
+    </p:spTree>
+    <p:extLst>
+      <p:ext uri="{BB962C8B-B14F-4D97-AF65-F5344CB8AC3E}">
+        <p14:creationId xmlns:p14="http://schemas.microsoft.com/office/powerpoint/2010/main" val="1491863617"/>
+      </p:ext>
+    </p:extLst>
+  </p:cSld>
+  <p:clrMapOvr>
+    <a:masterClrMapping/>
+  </p:clrMapOvr>
+</p:sld>
+</file>
+
+<file path=ppt/slides/slide3.xml><?xml version="1.0" encoding="utf-8"?>
 <p:sld xmlns:a="http://schemas.openxmlformats.org/drawingml/2006/main" xmlns:r="http://schemas.openxmlformats.org/officeDocument/2006/relationships" xmlns:p="http://schemas.openxmlformats.org/presentationml/2006/main">
   <p:cSld>
     <p:spTree>
@@ -3824,7 +3930,7 @@
 </p:sld>
 </file>
 
-<file path=ppt/slides/slide3.xml><?xml version="1.0" encoding="utf-8"?>
+<file path=ppt/slides/slide4.xml><?xml version="1.0" encoding="utf-8"?>
 <p:sld xmlns:a="http://schemas.openxmlformats.org/drawingml/2006/main" xmlns:r="http://schemas.openxmlformats.org/officeDocument/2006/relationships" xmlns:p="http://schemas.openxmlformats.org/presentationml/2006/main">
   <p:cSld>
     <p:spTree>
@@ -3901,7 +4007,7 @@
 </p:sld>
 </file>
 
-<file path=ppt/slides/slide4.xml><?xml version="1.0" encoding="utf-8"?>
+<file path=ppt/slides/slide5.xml><?xml version="1.0" encoding="utf-8"?>
 <p:sld xmlns:a="http://schemas.openxmlformats.org/drawingml/2006/main" xmlns:r="http://schemas.openxmlformats.org/officeDocument/2006/relationships" xmlns:p="http://schemas.openxmlformats.org/presentationml/2006/main">
   <p:cSld>
     <p:spTree>
@@ -8777,7 +8883,7 @@
 </p:sld>
 </file>
 
-<file path=ppt/slides/slide5.xml><?xml version="1.0" encoding="utf-8"?>
+<file path=ppt/slides/slide6.xml><?xml version="1.0" encoding="utf-8"?>
 <p:sld xmlns:a="http://schemas.openxmlformats.org/drawingml/2006/main" xmlns:r="http://schemas.openxmlformats.org/officeDocument/2006/relationships" xmlns:p="http://schemas.openxmlformats.org/presentationml/2006/main">
   <p:cSld>
     <p:spTree>
@@ -8979,7 +9085,7 @@
 </p:sld>
 </file>
 
-<file path=ppt/slides/slide6.xml><?xml version="1.0" encoding="utf-8"?>
+<file path=ppt/slides/slide7.xml><?xml version="1.0" encoding="utf-8"?>
 <p:sld xmlns:a="http://schemas.openxmlformats.org/drawingml/2006/main" xmlns:r="http://schemas.openxmlformats.org/officeDocument/2006/relationships" xmlns:p="http://schemas.openxmlformats.org/presentationml/2006/main">
   <p:cSld>
     <p:spTree>

</xml_diff>